<commit_message>
テーブル名を account -> accounts にする
accountは複数あるので、複数形に変えた。
</commit_message>
<xml_diff>
--- a/design/Webアプリケーションシステム.pptx
+++ b/design/Webアプリケーションシステム.pptx
@@ -5092,7 +5092,7 @@
           <p:nvPr>
             <p:extLst>
               <p:ext uri="{D42A27DB-BD31-4B8C-83A1-F6EECF244321}">
-                <p14:modId xmlns:p14="http://schemas.microsoft.com/office/powerpoint/2010/main" val="2149692944"/>
+                <p14:modId xmlns:p14="http://schemas.microsoft.com/office/powerpoint/2010/main" val="3860686328"/>
               </p:ext>
             </p:extLst>
           </p:nvPr>
@@ -5122,7 +5122,7 @@
                       <a:pPr algn="ctr"/>
                       <a:r>
                         <a:rPr kumimoji="1" lang="en-US" altLang="ja-JP" sz="2800" dirty="0" smtClean="0"/>
-                        <a:t>account</a:t>
+                        <a:t>accounts</a:t>
                       </a:r>
                       <a:endParaRPr kumimoji="1" lang="ja-JP" altLang="en-US" sz="2800" dirty="0"/>
                     </a:p>
@@ -5470,15 +5470,7 @@
                   <a:srgbClr val="7030A0"/>
                 </a:solidFill>
               </a:rPr>
-              <a:t>未対応</a:t>
-            </a:r>
-            <a:r>
-              <a:rPr lang="ja-JP" altLang="en-US" sz="4400" b="1" dirty="0" smtClean="0">
-                <a:solidFill>
-                  <a:srgbClr val="7030A0"/>
-                </a:solidFill>
-              </a:rPr>
-              <a:t>）（例）</a:t>
+              <a:t>未対応）（例）</a:t>
             </a:r>
             <a:endParaRPr kumimoji="1" lang="ja-JP" altLang="en-US" sz="4400" b="1" dirty="0">
               <a:solidFill>
@@ -6556,7 +6548,7 @@
           <p:nvPr>
             <p:extLst>
               <p:ext uri="{D42A27DB-BD31-4B8C-83A1-F6EECF244321}">
-                <p14:modId xmlns:p14="http://schemas.microsoft.com/office/powerpoint/2010/main" val="1682193232"/>
+                <p14:modId xmlns:p14="http://schemas.microsoft.com/office/powerpoint/2010/main" val="2268699450"/>
               </p:ext>
             </p:extLst>
           </p:nvPr>
@@ -6586,7 +6578,7 @@
                       <a:pPr algn="ctr"/>
                       <a:r>
                         <a:rPr kumimoji="1" lang="en-US" altLang="ja-JP" sz="2800" dirty="0" smtClean="0"/>
-                        <a:t>account</a:t>
+                        <a:t>accounts</a:t>
                       </a:r>
                       <a:endParaRPr kumimoji="1" lang="ja-JP" altLang="en-US" sz="2800" dirty="0"/>
                     </a:p>
@@ -6976,15 +6968,7 @@
                   <a:srgbClr val="7030A0"/>
                 </a:solidFill>
               </a:rPr>
-              <a:t>会員登録</a:t>
-            </a:r>
-            <a:r>
-              <a:rPr lang="ja-JP" altLang="en-US" sz="4400" b="1" dirty="0" smtClean="0">
-                <a:solidFill>
-                  <a:srgbClr val="7030A0"/>
-                </a:solidFill>
-              </a:rPr>
-              <a:t>システム（</a:t>
+              <a:t>会員登録システム（</a:t>
             </a:r>
             <a:r>
               <a:rPr lang="en-US" altLang="ja-JP" sz="4400" b="1" dirty="0" smtClean="0">
@@ -7671,11 +7655,7 @@
           <a:p>
             <a:r>
               <a:rPr lang="en-US" altLang="ja-JP" sz="3200" dirty="0" smtClean="0"/>
-              <a:t>PW</a:t>
-            </a:r>
-            <a:r>
-              <a:rPr lang="en-US" altLang="ja-JP" sz="3200" dirty="0" smtClean="0"/>
-              <a:t>(</a:t>
+              <a:t>PW(</a:t>
             </a:r>
             <a:r>
               <a:rPr lang="ja-JP" altLang="en-US" sz="3200" dirty="0" smtClean="0"/>
@@ -7988,7 +7968,7 @@
           <p:nvPr>
             <p:extLst>
               <p:ext uri="{D42A27DB-BD31-4B8C-83A1-F6EECF244321}">
-                <p14:modId xmlns:p14="http://schemas.microsoft.com/office/powerpoint/2010/main" val="3702519167"/>
+                <p14:modId xmlns:p14="http://schemas.microsoft.com/office/powerpoint/2010/main" val="3734765836"/>
               </p:ext>
             </p:extLst>
           </p:nvPr>
@@ -8018,7 +7998,7 @@
                       <a:pPr algn="ctr"/>
                       <a:r>
                         <a:rPr kumimoji="1" lang="en-US" altLang="ja-JP" sz="2800" dirty="0" smtClean="0"/>
-                        <a:t>account</a:t>
+                        <a:t>accounts</a:t>
                       </a:r>
                       <a:endParaRPr kumimoji="1" lang="ja-JP" altLang="en-US" sz="2800" dirty="0"/>
                     </a:p>
@@ -8378,15 +8358,7 @@
                   <a:srgbClr val="7030A0"/>
                 </a:solidFill>
               </a:rPr>
-              <a:t>会員登録</a:t>
-            </a:r>
-            <a:r>
-              <a:rPr lang="ja-JP" altLang="en-US" sz="4400" b="1" dirty="0" smtClean="0">
-                <a:solidFill>
-                  <a:srgbClr val="7030A0"/>
-                </a:solidFill>
-              </a:rPr>
-              <a:t>システム（</a:t>
+              <a:t>会員登録システム（</a:t>
             </a:r>
             <a:r>
               <a:rPr lang="en-US" altLang="ja-JP" sz="4400" b="1" dirty="0" smtClean="0">
@@ -8402,15 +8374,7 @@
                   <a:srgbClr val="7030A0"/>
                 </a:solidFill>
               </a:rPr>
-              <a:t>未対応</a:t>
-            </a:r>
-            <a:r>
-              <a:rPr lang="ja-JP" altLang="en-US" sz="4400" b="1" dirty="0" smtClean="0">
-                <a:solidFill>
-                  <a:srgbClr val="7030A0"/>
-                </a:solidFill>
-              </a:rPr>
-              <a:t>）（例）</a:t>
+              <a:t>未対応）（例）</a:t>
             </a:r>
             <a:endParaRPr kumimoji="1" lang="ja-JP" altLang="en-US" sz="4400" b="1" dirty="0">
               <a:solidFill>
@@ -8905,7 +8869,7 @@
           <p:nvPr>
             <p:extLst>
               <p:ext uri="{D42A27DB-BD31-4B8C-83A1-F6EECF244321}">
-                <p14:modId xmlns:p14="http://schemas.microsoft.com/office/powerpoint/2010/main" val="3232099986"/>
+                <p14:modId xmlns:p14="http://schemas.microsoft.com/office/powerpoint/2010/main" val="736945221"/>
               </p:ext>
             </p:extLst>
           </p:nvPr>
@@ -8935,7 +8899,7 @@
                       <a:pPr algn="ctr"/>
                       <a:r>
                         <a:rPr kumimoji="1" lang="en-US" altLang="ja-JP" sz="2800" dirty="0" smtClean="0"/>
-                        <a:t>account</a:t>
+                        <a:t>accounts</a:t>
                       </a:r>
                       <a:endParaRPr kumimoji="1" lang="ja-JP" altLang="en-US" sz="2800" dirty="0"/>
                     </a:p>
@@ -9189,8 +9153,9 @@
             </a:r>
             <a:r>
               <a:rPr lang="en-US" altLang="ja-JP" dirty="0" smtClean="0"/>
-              <a:t>account</a:t>
-            </a:r>
+              <a:t>accounts</a:t>
+            </a:r>
+            <a:endParaRPr lang="en-US" altLang="ja-JP" dirty="0" smtClean="0"/>
           </a:p>
           <a:p>
             <a:pPr lvl="1"/>
@@ -9336,11 +9301,7 @@
             </a:r>
             <a:r>
               <a:rPr lang="ja-JP" altLang="en-US" dirty="0" smtClean="0"/>
-              <a:t>進数を保存</a:t>
-            </a:r>
-            <a:r>
-              <a:rPr lang="ja-JP" altLang="en-US" dirty="0" smtClean="0"/>
-              <a:t>する</a:t>
+              <a:t>進数を保存する</a:t>
             </a:r>
             <a:endParaRPr lang="en-US" altLang="ja-JP" dirty="0" smtClean="0"/>
           </a:p>
@@ -11051,7 +11012,7 @@
           <p:nvPr>
             <p:extLst>
               <p:ext uri="{D42A27DB-BD31-4B8C-83A1-F6EECF244321}">
-                <p14:modId xmlns:p14="http://schemas.microsoft.com/office/powerpoint/2010/main" val="1395389353"/>
+                <p14:modId xmlns:p14="http://schemas.microsoft.com/office/powerpoint/2010/main" val="46847494"/>
               </p:ext>
             </p:extLst>
           </p:nvPr>
@@ -11081,7 +11042,7 @@
                       <a:pPr algn="ctr"/>
                       <a:r>
                         <a:rPr kumimoji="1" lang="en-US" altLang="ja-JP" sz="2800" dirty="0" smtClean="0"/>
-                        <a:t>account</a:t>
+                        <a:t>accounts</a:t>
                       </a:r>
                       <a:endParaRPr kumimoji="1" lang="ja-JP" altLang="en-US" sz="2800" dirty="0"/>
                     </a:p>
@@ -12152,11 +12113,7 @@
           <a:p>
             <a:r>
               <a:rPr lang="en-US" altLang="ja-JP" sz="3200" dirty="0" smtClean="0"/>
-              <a:t>PW</a:t>
-            </a:r>
-            <a:r>
-              <a:rPr lang="en-US" altLang="ja-JP" sz="3200" dirty="0" smtClean="0"/>
-              <a:t>(</a:t>
+              <a:t>PW(</a:t>
             </a:r>
             <a:r>
               <a:rPr lang="ja-JP" altLang="en-US" sz="3200" dirty="0" smtClean="0"/>

</xml_diff>